<commit_message>
Changes logs: 1. Add comments in code 2. Change how to run section to use example consumer_220 instead 3. Revise README.md file to match article
</commit_message>
<xml_diff>
--- a/Diagram/Diagram.pptx
+++ b/Diagram/Diagram.pptx
@@ -290,7 +290,7 @@
             <a:fld id="{1D8BD707-D9CF-40AE-B4C6-C98DA3205C09}" type="datetimeFigureOut">
               <a:rPr lang="en-US" smtClean="0"/>
               <a:pPr/>
-              <a:t>07-Mar-18</a:t>
+              <a:t>04-Sep-18</a:t>
             </a:fld>
             <a:endParaRPr lang="en-US"/>
           </a:p>
@@ -457,7 +457,7 @@
             <a:fld id="{1D8BD707-D9CF-40AE-B4C6-C98DA3205C09}" type="datetimeFigureOut">
               <a:rPr lang="en-US" smtClean="0"/>
               <a:pPr/>
-              <a:t>07-Mar-18</a:t>
+              <a:t>04-Sep-18</a:t>
             </a:fld>
             <a:endParaRPr lang="en-US"/>
           </a:p>
@@ -634,7 +634,7 @@
             <a:fld id="{1D8BD707-D9CF-40AE-B4C6-C98DA3205C09}" type="datetimeFigureOut">
               <a:rPr lang="en-US" smtClean="0"/>
               <a:pPr/>
-              <a:t>07-Mar-18</a:t>
+              <a:t>04-Sep-18</a:t>
             </a:fld>
             <a:endParaRPr lang="en-US"/>
           </a:p>
@@ -801,7 +801,7 @@
             <a:fld id="{1D8BD707-D9CF-40AE-B4C6-C98DA3205C09}" type="datetimeFigureOut">
               <a:rPr lang="en-US" smtClean="0"/>
               <a:pPr/>
-              <a:t>07-Mar-18</a:t>
+              <a:t>04-Sep-18</a:t>
             </a:fld>
             <a:endParaRPr lang="en-US"/>
           </a:p>
@@ -1044,7 +1044,7 @@
             <a:fld id="{1D8BD707-D9CF-40AE-B4C6-C98DA3205C09}" type="datetimeFigureOut">
               <a:rPr lang="en-US" smtClean="0"/>
               <a:pPr/>
-              <a:t>07-Mar-18</a:t>
+              <a:t>04-Sep-18</a:t>
             </a:fld>
             <a:endParaRPr lang="en-US"/>
           </a:p>
@@ -1329,7 +1329,7 @@
             <a:fld id="{1D8BD707-D9CF-40AE-B4C6-C98DA3205C09}" type="datetimeFigureOut">
               <a:rPr lang="en-US" smtClean="0"/>
               <a:pPr/>
-              <a:t>07-Mar-18</a:t>
+              <a:t>04-Sep-18</a:t>
             </a:fld>
             <a:endParaRPr lang="en-US"/>
           </a:p>
@@ -1748,7 +1748,7 @@
             <a:fld id="{1D8BD707-D9CF-40AE-B4C6-C98DA3205C09}" type="datetimeFigureOut">
               <a:rPr lang="en-US" smtClean="0"/>
               <a:pPr/>
-              <a:t>07-Mar-18</a:t>
+              <a:t>04-Sep-18</a:t>
             </a:fld>
             <a:endParaRPr lang="en-US"/>
           </a:p>
@@ -1863,7 +1863,7 @@
             <a:fld id="{1D8BD707-D9CF-40AE-B4C6-C98DA3205C09}" type="datetimeFigureOut">
               <a:rPr lang="en-US" smtClean="0"/>
               <a:pPr/>
-              <a:t>07-Mar-18</a:t>
+              <a:t>04-Sep-18</a:t>
             </a:fld>
             <a:endParaRPr lang="en-US"/>
           </a:p>
@@ -1955,7 +1955,7 @@
             <a:fld id="{1D8BD707-D9CF-40AE-B4C6-C98DA3205C09}" type="datetimeFigureOut">
               <a:rPr lang="en-US" smtClean="0"/>
               <a:pPr/>
-              <a:t>07-Mar-18</a:t>
+              <a:t>04-Sep-18</a:t>
             </a:fld>
             <a:endParaRPr lang="en-US"/>
           </a:p>
@@ -2229,7 +2229,7 @@
             <a:fld id="{1D8BD707-D9CF-40AE-B4C6-C98DA3205C09}" type="datetimeFigureOut">
               <a:rPr lang="en-US" smtClean="0"/>
               <a:pPr/>
-              <a:t>07-Mar-18</a:t>
+              <a:t>04-Sep-18</a:t>
             </a:fld>
             <a:endParaRPr lang="en-US"/>
           </a:p>
@@ -2479,7 +2479,7 @@
             <a:fld id="{1D8BD707-D9CF-40AE-B4C6-C98DA3205C09}" type="datetimeFigureOut">
               <a:rPr lang="en-US" smtClean="0"/>
               <a:pPr/>
-              <a:t>07-Mar-18</a:t>
+              <a:t>04-Sep-18</a:t>
             </a:fld>
             <a:endParaRPr lang="en-US"/>
           </a:p>
@@ -2689,7 +2689,7 @@
             <a:fld id="{1D8BD707-D9CF-40AE-B4C6-C98DA3205C09}" type="datetimeFigureOut">
               <a:rPr lang="en-US" smtClean="0"/>
               <a:pPr/>
-              <a:t>07-Mar-18</a:t>
+              <a:t>04-Sep-18</a:t>
             </a:fld>
             <a:endParaRPr lang="en-US"/>
           </a:p>

</xml_diff>